<commit_message>
change on final slide
</commit_message>
<xml_diff>
--- a/cs447_lab6_Oct14.pptx
+++ b/cs447_lab6_Oct14.pptx
@@ -211,7 +211,7 @@
           <a:p>
             <a:fld id="{79DACF82-7282-4538-9925-81D795D18BF0}" type="datetimeFigureOut">
               <a:rPr lang="en-US" smtClean="0"/>
-              <a:t>10/13/2016</a:t>
+              <a:t>10/14/2016</a:t>
             </a:fld>
             <a:endParaRPr lang="en-US"/>
           </a:p>
@@ -609,7 +609,7 @@
           <a:p>
             <a:fld id="{7880F47B-3C72-48E5-9CD2-8B9AE0E9AFF7}" type="datetimeFigureOut">
               <a:rPr lang="en-US" smtClean="0"/>
-              <a:t>10/13/2016</a:t>
+              <a:t>10/14/2016</a:t>
             </a:fld>
             <a:endParaRPr lang="en-US"/>
           </a:p>
@@ -779,7 +779,7 @@
           <a:p>
             <a:fld id="{7880F47B-3C72-48E5-9CD2-8B9AE0E9AFF7}" type="datetimeFigureOut">
               <a:rPr lang="en-US" smtClean="0"/>
-              <a:t>10/13/2016</a:t>
+              <a:t>10/14/2016</a:t>
             </a:fld>
             <a:endParaRPr lang="en-US"/>
           </a:p>
@@ -959,7 +959,7 @@
           <a:p>
             <a:fld id="{7880F47B-3C72-48E5-9CD2-8B9AE0E9AFF7}" type="datetimeFigureOut">
               <a:rPr lang="en-US" smtClean="0"/>
-              <a:t>10/13/2016</a:t>
+              <a:t>10/14/2016</a:t>
             </a:fld>
             <a:endParaRPr lang="en-US"/>
           </a:p>
@@ -1129,7 +1129,7 @@
           <a:p>
             <a:fld id="{7880F47B-3C72-48E5-9CD2-8B9AE0E9AFF7}" type="datetimeFigureOut">
               <a:rPr lang="en-US" smtClean="0"/>
-              <a:t>10/13/2016</a:t>
+              <a:t>10/14/2016</a:t>
             </a:fld>
             <a:endParaRPr lang="en-US"/>
           </a:p>
@@ -1373,7 +1373,7 @@
           <a:p>
             <a:fld id="{7880F47B-3C72-48E5-9CD2-8B9AE0E9AFF7}" type="datetimeFigureOut">
               <a:rPr lang="en-US" smtClean="0"/>
-              <a:t>10/13/2016</a:t>
+              <a:t>10/14/2016</a:t>
             </a:fld>
             <a:endParaRPr lang="en-US"/>
           </a:p>
@@ -1605,7 +1605,7 @@
           <a:p>
             <a:fld id="{7880F47B-3C72-48E5-9CD2-8B9AE0E9AFF7}" type="datetimeFigureOut">
               <a:rPr lang="en-US" smtClean="0"/>
-              <a:t>10/13/2016</a:t>
+              <a:t>10/14/2016</a:t>
             </a:fld>
             <a:endParaRPr lang="en-US"/>
           </a:p>
@@ -1972,7 +1972,7 @@
           <a:p>
             <a:fld id="{7880F47B-3C72-48E5-9CD2-8B9AE0E9AFF7}" type="datetimeFigureOut">
               <a:rPr lang="en-US" smtClean="0"/>
-              <a:t>10/13/2016</a:t>
+              <a:t>10/14/2016</a:t>
             </a:fld>
             <a:endParaRPr lang="en-US"/>
           </a:p>
@@ -2090,7 +2090,7 @@
           <a:p>
             <a:fld id="{7880F47B-3C72-48E5-9CD2-8B9AE0E9AFF7}" type="datetimeFigureOut">
               <a:rPr lang="en-US" smtClean="0"/>
-              <a:t>10/13/2016</a:t>
+              <a:t>10/14/2016</a:t>
             </a:fld>
             <a:endParaRPr lang="en-US"/>
           </a:p>
@@ -2185,7 +2185,7 @@
           <a:p>
             <a:fld id="{7880F47B-3C72-48E5-9CD2-8B9AE0E9AFF7}" type="datetimeFigureOut">
               <a:rPr lang="en-US" smtClean="0"/>
-              <a:t>10/13/2016</a:t>
+              <a:t>10/14/2016</a:t>
             </a:fld>
             <a:endParaRPr lang="en-US"/>
           </a:p>
@@ -2462,7 +2462,7 @@
           <a:p>
             <a:fld id="{7880F47B-3C72-48E5-9CD2-8B9AE0E9AFF7}" type="datetimeFigureOut">
               <a:rPr lang="en-US" smtClean="0"/>
-              <a:t>10/13/2016</a:t>
+              <a:t>10/14/2016</a:t>
             </a:fld>
             <a:endParaRPr lang="en-US"/>
           </a:p>
@@ -2719,7 +2719,7 @@
           <a:p>
             <a:fld id="{7880F47B-3C72-48E5-9CD2-8B9AE0E9AFF7}" type="datetimeFigureOut">
               <a:rPr lang="en-US" smtClean="0"/>
-              <a:t>10/13/2016</a:t>
+              <a:t>10/14/2016</a:t>
             </a:fld>
             <a:endParaRPr lang="en-US"/>
           </a:p>
@@ -2932,7 +2932,7 @@
           <a:p>
             <a:fld id="{7880F47B-3C72-48E5-9CD2-8B9AE0E9AFF7}" type="datetimeFigureOut">
               <a:rPr lang="en-US" smtClean="0"/>
-              <a:t>10/13/2016</a:t>
+              <a:t>10/14/2016</a:t>
             </a:fld>
             <a:endParaRPr lang="en-US"/>
           </a:p>
@@ -3492,6 +3492,13 @@
   <p:clrMapOvr>
     <a:masterClrMapping/>
   </p:clrMapOvr>
+  <p:timing>
+    <p:tnLst>
+      <p:par>
+        <p:cTn id="1" dur="indefinite" restart="never" nodeType="tmRoot"/>
+      </p:par>
+    </p:tnLst>
+  </p:timing>
 </p:sld>
 </file>
 
@@ -3699,6 +3706,13 @@
   <p:clrMapOvr>
     <a:masterClrMapping/>
   </p:clrMapOvr>
+  <p:timing>
+    <p:tnLst>
+      <p:par>
+        <p:cTn id="1" dur="indefinite" restart="never" nodeType="tmRoot"/>
+      </p:par>
+    </p:tnLst>
+  </p:timing>
 </p:sld>
 </file>
 
@@ -3818,6 +3832,13 @@
   <p:clrMapOvr>
     <a:masterClrMapping/>
   </p:clrMapOvr>
+  <p:timing>
+    <p:tnLst>
+      <p:par>
+        <p:cTn id="1" dur="indefinite" restart="never" nodeType="tmRoot"/>
+      </p:par>
+    </p:tnLst>
+  </p:timing>
 </p:sld>
 </file>
 
@@ -3865,8 +3886,21 @@
                   <a:srgbClr val="002060"/>
                 </a:solidFill>
               </a:rPr>
-              <a:t>Function review (on board)</a:t>
-            </a:r>
+              <a:t>Function </a:t>
+            </a:r>
+            <a:r>
+              <a:rPr lang="en-US" sz="2800" dirty="0" smtClean="0">
+                <a:solidFill>
+                  <a:srgbClr val="002060"/>
+                </a:solidFill>
+              </a:rPr>
+              <a:t>review</a:t>
+            </a:r>
+            <a:endParaRPr lang="en-US" sz="2800" dirty="0">
+              <a:solidFill>
+                <a:srgbClr val="002060"/>
+              </a:solidFill>
+            </a:endParaRPr>
           </a:p>
         </p:txBody>
       </p:sp>
@@ -3880,6 +3914,13 @@
   <p:clrMapOvr>
     <a:masterClrMapping/>
   </p:clrMapOvr>
+  <p:timing>
+    <p:tnLst>
+      <p:par>
+        <p:cTn id="1" dur="indefinite" restart="never" nodeType="tmRoot"/>
+      </p:par>
+    </p:tnLst>
+  </p:timing>
 </p:sld>
 </file>
 

</xml_diff>